<commit_message>
added requirements and update slides from a typo
</commit_message>
<xml_diff>
--- a/docs/final_presentation.pptx
+++ b/docs/final_presentation.pptx
@@ -5582,11 +5582,7 @@
           <a:p>
             <a:r>
               <a:rPr lang="en-US" dirty="0" smtClean="0"/>
-              <a:t>The RAICHU API will allow developers to easily implement the cloud services to new projects as well inject the capabilities into existing </a:t>
-            </a:r>
-            <a:r>
-              <a:rPr lang="en-US" smtClean="0"/>
-              <a:t>source code.</a:t>
+              <a:t>The RAICHU API will allow developers to easily implement the cloud services to new projects as well inject the capabilities into existing source code.</a:t>
             </a:r>
             <a:endParaRPr lang="en-US" dirty="0"/>
           </a:p>
@@ -5609,10 +5605,14 @@
           <a:p>
             <a:pPr algn="ctr"/>
             <a:r>
-              <a:rPr lang="en-US" u="sng" dirty="0" smtClean="0"/>
+              <a:rPr lang="en-US" u="sng" dirty="0" smtClean="0">
+                <a:latin typeface="Alien Encounters Solid" pitchFamily="2" charset="0"/>
+              </a:rPr>
               <a:t>THE IDEA</a:t>
             </a:r>
-            <a:endParaRPr lang="en-US" u="sng" dirty="0"/>
+            <a:endParaRPr lang="en-US" u="sng" dirty="0">
+              <a:latin typeface="Alien Encounters Solid" pitchFamily="2" charset="0"/>
+            </a:endParaRPr>
           </a:p>
         </p:txBody>
       </p:sp>
@@ -5673,7 +5673,15 @@
           <a:p>
             <a:r>
               <a:rPr lang="en-US" sz="2800" dirty="0" smtClean="0"/>
-              <a:t>Whether is a lock, light, safe, stereo, microwave or camera, Every device than can be controlled is right for RAICHU.</a:t>
+              <a:t>Whether is a lock, light, safe, stereo, microwave or camera, Every device </a:t>
+            </a:r>
+            <a:r>
+              <a:rPr lang="en-US" sz="2800" smtClean="0"/>
+              <a:t>that needs to </a:t>
+            </a:r>
+            <a:r>
+              <a:rPr lang="en-US" sz="2800" dirty="0" smtClean="0"/>
+              <a:t>be controlled is right for RAICHU.</a:t>
             </a:r>
           </a:p>
           <a:p>

</xml_diff>